<commit_message>
lecture 05, change final date of seminar project
</commit_message>
<xml_diff>
--- a/Prezentace/1. ročník/PGM_04.pptx
+++ b/Prezentace/1. ročník/PGM_04.pptx
@@ -14,7 +14,6 @@
     <p:sldId id="270" r:id="rId8"/>
     <p:sldId id="268" r:id="rId9"/>
     <p:sldId id="272" r:id="rId10"/>
-    <p:sldId id="264" r:id="rId11"/>
   </p:sldIdLst>
   <p:sldSz cx="12192000" cy="6858000"/>
   <p:notesSz cx="6858000" cy="9144000"/>
@@ -867,7 +866,7 @@
             <a:fld id="{B61BEF0D-F0BB-DE4B-95CE-6DB70DBA9567}" type="datetimeFigureOut">
               <a:rPr lang="en-US" dirty="0"/>
               <a:pPr/>
-              <a:t>10/12/2020</a:t>
+              <a:t>11/8/2021</a:t>
             </a:fld>
             <a:endParaRPr lang="en-US" dirty="0"/>
           </a:p>
@@ -1115,7 +1114,7 @@
             <a:fld id="{B61BEF0D-F0BB-DE4B-95CE-6DB70DBA9567}" type="datetimeFigureOut">
               <a:rPr lang="en-US" dirty="0"/>
               <a:pPr/>
-              <a:t>10/12/2020</a:t>
+              <a:t>11/8/2021</a:t>
             </a:fld>
             <a:endParaRPr lang="en-US" dirty="0"/>
           </a:p>
@@ -1426,7 +1425,7 @@
             <a:fld id="{B61BEF0D-F0BB-DE4B-95CE-6DB70DBA9567}" type="datetimeFigureOut">
               <a:rPr lang="en-US" dirty="0"/>
               <a:pPr/>
-              <a:t>10/12/2020</a:t>
+              <a:t>11/8/2021</a:t>
             </a:fld>
             <a:endParaRPr lang="en-US" dirty="0"/>
           </a:p>
@@ -1756,7 +1755,7 @@
             <a:fld id="{B61BEF0D-F0BB-DE4B-95CE-6DB70DBA9567}" type="datetimeFigureOut">
               <a:rPr lang="en-US" dirty="0"/>
               <a:pPr/>
-              <a:t>10/12/2020</a:t>
+              <a:t>11/8/2021</a:t>
             </a:fld>
             <a:endParaRPr lang="en-US" dirty="0"/>
           </a:p>
@@ -2067,7 +2066,7 @@
             <a:fld id="{B61BEF0D-F0BB-DE4B-95CE-6DB70DBA9567}" type="datetimeFigureOut">
               <a:rPr lang="en-US" dirty="0"/>
               <a:pPr/>
-              <a:t>10/12/2020</a:t>
+              <a:t>11/8/2021</a:t>
             </a:fld>
             <a:endParaRPr lang="en-US" dirty="0"/>
           </a:p>
@@ -2457,7 +2456,7 @@
             <a:fld id="{B61BEF0D-F0BB-DE4B-95CE-6DB70DBA9567}" type="datetimeFigureOut">
               <a:rPr lang="en-US" dirty="0"/>
               <a:pPr/>
-              <a:t>10/12/2020</a:t>
+              <a:t>11/8/2021</a:t>
             </a:fld>
             <a:endParaRPr lang="en-US" dirty="0"/>
           </a:p>
@@ -2623,7 +2622,7 @@
           <a:p>
             <a:fld id="{55C6B4A9-1611-4792-9094-5F34BCA07E0B}" type="datetimeFigureOut">
               <a:rPr lang="en-US" dirty="0"/>
-              <a:t>10/12/2020</a:t>
+              <a:t>11/8/2021</a:t>
             </a:fld>
             <a:endParaRPr lang="en-US" dirty="0"/>
           </a:p>
@@ -2799,7 +2798,7 @@
             <a:fld id="{B61BEF0D-F0BB-DE4B-95CE-6DB70DBA9567}" type="datetimeFigureOut">
               <a:rPr lang="en-US" dirty="0"/>
               <a:pPr/>
-              <a:t>10/12/2020</a:t>
+              <a:t>11/8/2021</a:t>
             </a:fld>
             <a:endParaRPr lang="en-US" dirty="0"/>
           </a:p>
@@ -2965,7 +2964,7 @@
           <a:p>
             <a:fld id="{42A54C80-263E-416B-A8E0-580EDEADCBDC}" type="datetimeFigureOut">
               <a:rPr lang="en-US" dirty="0"/>
-              <a:t>10/12/2020</a:t>
+              <a:t>11/8/2021</a:t>
             </a:fld>
             <a:endParaRPr lang="en-US" dirty="0"/>
           </a:p>
@@ -3208,7 +3207,7 @@
             <a:fld id="{B61BEF0D-F0BB-DE4B-95CE-6DB70DBA9567}" type="datetimeFigureOut">
               <a:rPr lang="en-US" dirty="0"/>
               <a:pPr/>
-              <a:t>10/12/2020</a:t>
+              <a:t>11/8/2021</a:t>
             </a:fld>
             <a:endParaRPr lang="en-US" dirty="0"/>
           </a:p>
@@ -3436,7 +3435,7 @@
           <a:p>
             <a:fld id="{42A54C80-263E-416B-A8E0-580EDEADCBDC}" type="datetimeFigureOut">
               <a:rPr lang="en-US" dirty="0"/>
-              <a:t>10/12/2020</a:t>
+              <a:t>11/8/2021</a:t>
             </a:fld>
             <a:endParaRPr lang="en-US" dirty="0"/>
           </a:p>
@@ -3806,7 +3805,7 @@
             <a:fld id="{B61BEF0D-F0BB-DE4B-95CE-6DB70DBA9567}" type="datetimeFigureOut">
               <a:rPr lang="en-US" dirty="0"/>
               <a:pPr/>
-              <a:t>10/12/2020</a:t>
+              <a:t>11/8/2021</a:t>
             </a:fld>
             <a:endParaRPr lang="en-US" dirty="0"/>
           </a:p>
@@ -3926,7 +3925,7 @@
             <a:fld id="{B61BEF0D-F0BB-DE4B-95CE-6DB70DBA9567}" type="datetimeFigureOut">
               <a:rPr lang="en-US" dirty="0"/>
               <a:pPr/>
-              <a:t>10/12/2020</a:t>
+              <a:t>11/8/2021</a:t>
             </a:fld>
             <a:endParaRPr lang="en-US" dirty="0"/>
           </a:p>
@@ -4018,7 +4017,7 @@
             <a:fld id="{B61BEF0D-F0BB-DE4B-95CE-6DB70DBA9567}" type="datetimeFigureOut">
               <a:rPr lang="en-US" dirty="0"/>
               <a:pPr/>
-              <a:t>10/12/2020</a:t>
+              <a:t>11/8/2021</a:t>
             </a:fld>
             <a:endParaRPr lang="en-US" dirty="0"/>
           </a:p>
@@ -4269,7 +4268,7 @@
           <a:p>
             <a:fld id="{42A54C80-263E-416B-A8E0-580EDEADCBDC}" type="datetimeFigureOut">
               <a:rPr lang="en-US" dirty="0"/>
-              <a:t>10/12/2020</a:t>
+              <a:t>11/8/2021</a:t>
             </a:fld>
             <a:endParaRPr lang="en-US" dirty="0"/>
           </a:p>
@@ -4571,7 +4570,7 @@
             <a:fld id="{B61BEF0D-F0BB-DE4B-95CE-6DB70DBA9567}" type="datetimeFigureOut">
               <a:rPr lang="en-US" dirty="0"/>
               <a:pPr/>
-              <a:t>10/12/2020</a:t>
+              <a:t>11/8/2021</a:t>
             </a:fld>
             <a:endParaRPr lang="en-US" dirty="0"/>
           </a:p>
@@ -5269,7 +5268,7 @@
             <a:fld id="{B61BEF0D-F0BB-DE4B-95CE-6DB70DBA9567}" type="datetimeFigureOut">
               <a:rPr lang="en-US" dirty="0"/>
               <a:pPr/>
-              <a:t>10/12/2020</a:t>
+              <a:t>11/8/2021</a:t>
             </a:fld>
             <a:endParaRPr lang="en-US" dirty="0"/>
           </a:p>
@@ -5858,127 +5857,6 @@
 </p:sld>
 </file>
 
-<file path=ppt/slides/slide10.xml><?xml version="1.0" encoding="utf-8"?>
-<p:sld xmlns:a="http://schemas.openxmlformats.org/drawingml/2006/main" xmlns:r="http://schemas.openxmlformats.org/officeDocument/2006/relationships" xmlns:p="http://schemas.openxmlformats.org/presentationml/2006/main" show="0">
-  <p:cSld>
-    <p:bg>
-      <p:bgPr>
-        <a:solidFill>
-          <a:schemeClr val="bg1"/>
-        </a:solidFill>
-        <a:effectLst/>
-      </p:bgPr>
-    </p:bg>
-    <p:spTree>
-      <p:nvGrpSpPr>
-        <p:cNvPr id="1" name=""/>
-        <p:cNvGrpSpPr/>
-        <p:nvPr/>
-      </p:nvGrpSpPr>
-      <p:grpSpPr>
-        <a:xfrm>
-          <a:off x="0" y="0"/>
-          <a:ext cx="0" cy="0"/>
-          <a:chOff x="0" y="0"/>
-          <a:chExt cx="0" cy="0"/>
-        </a:xfrm>
-      </p:grpSpPr>
-      <p:sp>
-        <p:nvSpPr>
-          <p:cNvPr id="2" name="Nadpis 1">
-            <a:extLst>
-              <a:ext uri="{FF2B5EF4-FFF2-40B4-BE49-F238E27FC236}">
-                <a16:creationId xmlns:a16="http://schemas.microsoft.com/office/drawing/2014/main" id="{63919622-7028-4626-8A48-42A3C5F7A6E1}"/>
-              </a:ext>
-            </a:extLst>
-          </p:cNvPr>
-          <p:cNvSpPr>
-            <a:spLocks noGrp="1"/>
-          </p:cNvSpPr>
-          <p:nvPr>
-            <p:ph type="title"/>
-          </p:nvPr>
-        </p:nvSpPr>
-        <p:spPr/>
-        <p:txBody>
-          <a:bodyPr vert="horz" lIns="91440" tIns="45720" rIns="91440" bIns="45720" rtlCol="0" anchor="ctr">
-            <a:normAutofit fontScale="90000"/>
-          </a:bodyPr>
-          <a:lstStyle/>
-          <a:p>
-            <a:pPr algn="ctr"/>
-            <a:r>
-              <a:rPr lang="en-US" sz="3600" dirty="0"/>
-              <a:t>Kahoot time!</a:t>
-            </a:r>
-          </a:p>
-        </p:txBody>
-      </p:sp>
-      <p:pic>
-        <p:nvPicPr>
-          <p:cNvPr id="7" name="Zástupný symbol obrázku 6" descr="Obsah obrázku kreslení&#10;&#10;Popis byl vytvořen automaticky">
-            <a:extLst>
-              <a:ext uri="{FF2B5EF4-FFF2-40B4-BE49-F238E27FC236}">
-                <a16:creationId xmlns:a16="http://schemas.microsoft.com/office/drawing/2014/main" id="{4422FCB4-1B0F-4FC6-B42F-FECD625E8C7D}"/>
-              </a:ext>
-            </a:extLst>
-          </p:cNvPr>
-          <p:cNvPicPr>
-            <a:picLocks noGrp="1" noChangeAspect="1"/>
-          </p:cNvPicPr>
-          <p:nvPr>
-            <p:ph type="pic" idx="1"/>
-          </p:nvPr>
-        </p:nvPicPr>
-        <p:blipFill rotWithShape="1">
-          <a:blip r:embed="rId2"/>
-          <a:srcRect t="27636" b="27636"/>
-          <a:stretch/>
-        </p:blipFill>
-        <p:spPr>
-          <a:prstGeom prst="rect">
-            <a:avLst/>
-          </a:prstGeom>
-        </p:spPr>
-      </p:pic>
-      <p:sp>
-        <p:nvSpPr>
-          <p:cNvPr id="6" name="Zástupný text 5">
-            <a:extLst>
-              <a:ext uri="{FF2B5EF4-FFF2-40B4-BE49-F238E27FC236}">
-                <a16:creationId xmlns:a16="http://schemas.microsoft.com/office/drawing/2014/main" id="{5BC5296E-041D-4EF0-8255-4C5A955D6D44}"/>
-              </a:ext>
-            </a:extLst>
-          </p:cNvPr>
-          <p:cNvSpPr>
-            <a:spLocks noGrp="1"/>
-          </p:cNvSpPr>
-          <p:nvPr>
-            <p:ph type="body" sz="half" idx="2"/>
-          </p:nvPr>
-        </p:nvSpPr>
-        <p:spPr/>
-        <p:txBody>
-          <a:bodyPr/>
-          <a:lstStyle/>
-          <a:p>
-            <a:endParaRPr lang="cs-CZ" dirty="0"/>
-          </a:p>
-        </p:txBody>
-      </p:sp>
-    </p:spTree>
-    <p:extLst>
-      <p:ext uri="{BB962C8B-B14F-4D97-AF65-F5344CB8AC3E}">
-        <p14:creationId xmlns:p14="http://schemas.microsoft.com/office/powerpoint/2010/main" val="879084657"/>
-      </p:ext>
-    </p:extLst>
-  </p:cSld>
-  <p:clrMapOvr>
-    <a:masterClrMapping/>
-  </p:clrMapOvr>
-</p:sld>
-</file>
-
 <file path=ppt/slides/slide2.xml><?xml version="1.0" encoding="utf-8"?>
 <p:sld xmlns:a="http://schemas.openxmlformats.org/drawingml/2006/main" xmlns:r="http://schemas.openxmlformats.org/officeDocument/2006/relationships" xmlns:p="http://schemas.openxmlformats.org/presentationml/2006/main">
   <p:cSld>

</xml_diff>